<commit_message>
Adição do lean canvas na apresentação
</commit_message>
<xml_diff>
--- a/PITCH PROJETO INTEGRADOR.pptx
+++ b/PITCH PROJETO INTEGRADOR.pptx
@@ -7,11 +7,12 @@
   <p:sldIdLst>
     <p:sldId id="256" r:id="rId2"/>
     <p:sldId id="257" r:id="rId3"/>
-    <p:sldId id="258" r:id="rId4"/>
-    <p:sldId id="259" r:id="rId5"/>
-    <p:sldId id="262" r:id="rId6"/>
-    <p:sldId id="260" r:id="rId7"/>
-    <p:sldId id="261" r:id="rId8"/>
+    <p:sldId id="263" r:id="rId4"/>
+    <p:sldId id="258" r:id="rId5"/>
+    <p:sldId id="259" r:id="rId6"/>
+    <p:sldId id="262" r:id="rId7"/>
+    <p:sldId id="260" r:id="rId8"/>
+    <p:sldId id="261" r:id="rId9"/>
   </p:sldIdLst>
   <p:sldSz cx="12192000" cy="6858000"/>
   <p:notesSz cx="6858000" cy="9144000"/>
@@ -6659,6 +6660,94 @@
           <a:chExt cx="0" cy="0"/>
         </a:xfrm>
       </p:grpSpPr>
+      <p:pic>
+        <p:nvPicPr>
+          <p:cNvPr id="19" name="Imagem 18"/>
+          <p:cNvPicPr>
+            <a:picLocks noChangeAspect="1"/>
+          </p:cNvPicPr>
+          <p:nvPr/>
+        </p:nvPicPr>
+        <p:blipFill>
+          <a:blip r:embed="rId2"/>
+          <a:stretch>
+            <a:fillRect/>
+          </a:stretch>
+        </p:blipFill>
+        <p:spPr>
+          <a:xfrm>
+            <a:off x="548643" y="1745960"/>
+            <a:ext cx="6771227" cy="5190628"/>
+          </a:xfrm>
+          <a:prstGeom prst="rect">
+            <a:avLst/>
+          </a:prstGeom>
+        </p:spPr>
+      </p:pic>
+      <p:sp>
+        <p:nvSpPr>
+          <p:cNvPr id="20" name="CaixaDeTexto 19"/>
+          <p:cNvSpPr txBox="1"/>
+          <p:nvPr/>
+        </p:nvSpPr>
+        <p:spPr>
+          <a:xfrm>
+            <a:off x="548643" y="441065"/>
+            <a:ext cx="6316153" cy="707886"/>
+          </a:xfrm>
+          <a:prstGeom prst="rect">
+            <a:avLst/>
+          </a:prstGeom>
+          <a:noFill/>
+        </p:spPr>
+        <p:txBody>
+          <a:bodyPr wrap="none" rtlCol="0">
+            <a:spAutoFit/>
+          </a:bodyPr>
+          <a:lstStyle/>
+          <a:p>
+            <a:r>
+              <a:rPr lang="pt-BR" sz="4000" dirty="0">
+                <a:latin typeface="Arial Black" panose="020B0A04020102020204" pitchFamily="34" charset="0"/>
+              </a:rPr>
+              <a:t>PLANO DE NEGÓCIOS</a:t>
+            </a:r>
+            <a:endParaRPr lang="pt-BR" sz="4000" dirty="0">
+              <a:latin typeface="Arial Black" panose="020B0A04020102020204" pitchFamily="34" charset="0"/>
+            </a:endParaRPr>
+          </a:p>
+        </p:txBody>
+      </p:sp>
+    </p:spTree>
+    <p:extLst>
+      <p:ext uri="{BB962C8B-B14F-4D97-AF65-F5344CB8AC3E}">
+        <p14:creationId xmlns:p14="http://schemas.microsoft.com/office/powerpoint/2010/main" val="1546754497"/>
+      </p:ext>
+    </p:extLst>
+  </p:cSld>
+  <p:clrMapOvr>
+    <a:masterClrMapping/>
+  </p:clrMapOvr>
+</p:sld>
+</file>
+
+<file path=ppt/slides/slide4.xml><?xml version="1.0" encoding="utf-8"?>
+<p:sld xmlns:a="http://schemas.openxmlformats.org/drawingml/2006/main" xmlns:r="http://schemas.openxmlformats.org/officeDocument/2006/relationships" xmlns:p="http://schemas.openxmlformats.org/presentationml/2006/main">
+  <p:cSld>
+    <p:spTree>
+      <p:nvGrpSpPr>
+        <p:cNvPr id="1" name=""/>
+        <p:cNvGrpSpPr/>
+        <p:nvPr/>
+      </p:nvGrpSpPr>
+      <p:grpSpPr>
+        <a:xfrm>
+          <a:off x="0" y="0"/>
+          <a:ext cx="0" cy="0"/>
+          <a:chOff x="0" y="0"/>
+          <a:chExt cx="0" cy="0"/>
+        </a:xfrm>
+      </p:grpSpPr>
       <p:sp>
         <p:nvSpPr>
           <p:cNvPr id="2" name="CaixaDeTexto 1"/>
@@ -8075,7 +8164,7 @@
 </p:sld>
 </file>
 
-<file path=ppt/slides/slide4.xml><?xml version="1.0" encoding="utf-8"?>
+<file path=ppt/slides/slide5.xml><?xml version="1.0" encoding="utf-8"?>
 <p:sld xmlns:a="http://schemas.openxmlformats.org/drawingml/2006/main" xmlns:r="http://schemas.openxmlformats.org/officeDocument/2006/relationships" xmlns:p="http://schemas.openxmlformats.org/presentationml/2006/main">
   <p:cSld>
     <p:spTree>
@@ -9394,7 +9483,7 @@
 </p:sld>
 </file>
 
-<file path=ppt/slides/slide5.xml><?xml version="1.0" encoding="utf-8"?>
+<file path=ppt/slides/slide6.xml><?xml version="1.0" encoding="utf-8"?>
 <p:sld xmlns:a="http://schemas.openxmlformats.org/drawingml/2006/main" xmlns:r="http://schemas.openxmlformats.org/officeDocument/2006/relationships" xmlns:p="http://schemas.openxmlformats.org/presentationml/2006/main">
   <p:cSld>
     <p:spTree>
@@ -9881,14 +9970,14 @@
               <a:t>de </a:t>
             </a:r>
             <a:r>
-              <a:rPr lang="pt-BR" b="1" smtClean="0">
+              <a:rPr lang="pt-BR" b="1" dirty="0" smtClean="0">
                 <a:latin typeface="Arial" panose="020B0604020202020204" pitchFamily="34" charset="0"/>
                 <a:cs typeface="Arial" panose="020B0604020202020204" pitchFamily="34" charset="0"/>
               </a:rPr>
               <a:t>segurança</a:t>
             </a:r>
             <a:r>
-              <a:rPr lang="pt-BR" b="1" smtClean="0">
+              <a:rPr lang="pt-BR" b="1" dirty="0" smtClean="0">
                 <a:latin typeface="Arial" panose="020B0604020202020204" pitchFamily="34" charset="0"/>
                 <a:cs typeface="Arial" panose="020B0604020202020204" pitchFamily="34" charset="0"/>
               </a:rPr>
@@ -10701,7 +10790,7 @@
 </p:sld>
 </file>
 
-<file path=ppt/slides/slide6.xml><?xml version="1.0" encoding="utf-8"?>
+<file path=ppt/slides/slide7.xml><?xml version="1.0" encoding="utf-8"?>
 <p:sld xmlns:a="http://schemas.openxmlformats.org/drawingml/2006/main" xmlns:r="http://schemas.openxmlformats.org/officeDocument/2006/relationships" xmlns:p="http://schemas.openxmlformats.org/presentationml/2006/main">
   <p:cSld>
     <p:spTree>
@@ -11248,7 +11337,7 @@
 </p:sld>
 </file>
 
-<file path=ppt/slides/slide7.xml><?xml version="1.0" encoding="utf-8"?>
+<file path=ppt/slides/slide8.xml><?xml version="1.0" encoding="utf-8"?>
 <p:sld xmlns:a="http://schemas.openxmlformats.org/drawingml/2006/main" xmlns:r="http://schemas.openxmlformats.org/officeDocument/2006/relationships" xmlns:p="http://schemas.openxmlformats.org/presentationml/2006/main">
   <p:cSld>
     <p:spTree>

</xml_diff>